<commit_message>
fix read me & pp
</commit_message>
<xml_diff>
--- a/Churn Prediction.pptx
+++ b/Churn Prediction.pptx
@@ -235,7 +235,7 @@
           <a:p>
             <a:fld id="{4AECD13F-9E93-4C57-A5BD-336347054114}" type="datetimeFigureOut">
               <a:rPr lang="en-US" smtClean="0"/>
-              <a:t>11/13/2022</a:t>
+              <a:t>12/1/2022</a:t>
             </a:fld>
             <a:endParaRPr lang="en-US"/>
           </a:p>
@@ -400,7 +400,7 @@
           <a:p>
             <a:fld id="{621D9606-6FF7-49AF-A412-4D6AB767DFC4}" type="datetimeFigureOut">
               <a:rPr lang="en-US" smtClean="0"/>
-              <a:t>11/13/2022</a:t>
+              <a:t>12/1/2022</a:t>
             </a:fld>
             <a:endParaRPr lang="en-US"/>
           </a:p>
@@ -1314,7 +1314,7 @@
             <a:fld id="{FFF30096-E2FA-4C53-8FFA-C198FACBBC31}" type="datetimeFigureOut">
               <a:rPr lang="en-US" smtClean="0"/>
               <a:pPr/>
-              <a:t>11/13/2022</a:t>
+              <a:t>12/1/2022</a:t>
             </a:fld>
             <a:endParaRPr lang="en-US" dirty="0"/>
           </a:p>
@@ -17309,7 +17309,7 @@
             <a:fld id="{FFF30096-E2FA-4C53-8FFA-C198FACBBC31}" type="datetimeFigureOut">
               <a:rPr lang="en-US" smtClean="0"/>
               <a:pPr/>
-              <a:t>11/13/2022</a:t>
+              <a:t>12/1/2022</a:t>
             </a:fld>
             <a:endParaRPr lang="en-US" dirty="0"/>
           </a:p>
@@ -33668,7 +33668,7 @@
             <a:fld id="{FFF30096-E2FA-4C53-8FFA-C198FACBBC31}" type="datetimeFigureOut">
               <a:rPr lang="en-US" smtClean="0"/>
               <a:pPr/>
-              <a:t>11/13/2022</a:t>
+              <a:t>12/1/2022</a:t>
             </a:fld>
             <a:endParaRPr lang="en-US" dirty="0"/>
           </a:p>
@@ -33925,7 +33925,7 @@
             <a:fld id="{FFF30096-E2FA-4C53-8FFA-C198FACBBC31}" type="datetimeFigureOut">
               <a:rPr lang="en-US" smtClean="0"/>
               <a:pPr/>
-              <a:t>11/13/2022</a:t>
+              <a:t>12/1/2022</a:t>
             </a:fld>
             <a:endParaRPr lang="en-US" dirty="0"/>
           </a:p>
@@ -35766,7 +35766,7 @@
             <a:fld id="{FFF30096-E2FA-4C53-8FFA-C198FACBBC31}" type="datetimeFigureOut">
               <a:rPr lang="en-US" smtClean="0"/>
               <a:pPr/>
-              <a:t>11/13/2022</a:t>
+              <a:t>12/1/2022</a:t>
             </a:fld>
             <a:endParaRPr lang="en-US" dirty="0"/>
           </a:p>
@@ -36141,7 +36141,7 @@
             <a:fld id="{FFF30096-E2FA-4C53-8FFA-C198FACBBC31}" type="datetimeFigureOut">
               <a:rPr lang="en-US" smtClean="0"/>
               <a:pPr/>
-              <a:t>11/13/2022</a:t>
+              <a:t>12/1/2022</a:t>
             </a:fld>
             <a:endParaRPr lang="en-US"/>
           </a:p>
@@ -37828,7 +37828,7 @@
                   <a:schemeClr val="tx2"/>
                 </a:solidFill>
               </a:rPr>
-              <a:t>We are trying to predict whether a customer will churn or not (classify each new customer).</a:t>
+              <a:t>Whether a customer will churn or not (classify each new customer).</a:t>
             </a:r>
           </a:p>
           <a:p>

</xml_diff>